<commit_message>
Update Agile Business Analysis Pitch.pptx
update
</commit_message>
<xml_diff>
--- a/Agile Business Analysis Pitch.pptx
+++ b/Agile Business Analysis Pitch.pptx
@@ -10,10 +10,10 @@
   <p:sldIdLst>
     <p:sldId id="256" r:id="rId5"/>
     <p:sldId id="257" r:id="rId6"/>
-    <p:sldId id="268" r:id="rId7"/>
-    <p:sldId id="267" r:id="rId8"/>
-    <p:sldId id="269" r:id="rId9"/>
-    <p:sldId id="270" r:id="rId10"/>
+    <p:sldId id="267" r:id="rId7"/>
+    <p:sldId id="269" r:id="rId8"/>
+    <p:sldId id="270" r:id="rId9"/>
+    <p:sldId id="268" r:id="rId10"/>
     <p:sldId id="271" r:id="rId11"/>
     <p:sldId id="262" r:id="rId12"/>
     <p:sldId id="266" r:id="rId13"/>
@@ -3252,11 +3252,11 @@
         <a:lstStyle/>
         <a:p>
           <a:r>
-            <a:rPr lang="en-GB" sz="1500" i="0" kern="1200" noProof="0"/>
+            <a:rPr lang="en-GB" sz="1500" i="0" kern="1200" noProof="0" dirty="0"/>
             <a:t>Cash-Money-Billionaire and exit </a:t>
           </a:r>
           <a:r>
-            <a:rPr lang="en-GB" sz="1500" i="0" kern="1200" noProof="0">
+            <a:rPr lang="en-GB" sz="1500" i="0" kern="1200" noProof="0" dirty="0">
               <a:solidFill>
                 <a:srgbClr val="000000">
                   <a:hueOff val="0"/>
@@ -3272,7 +3272,7 @@
             <a:t>with</a:t>
           </a:r>
           <a:r>
-            <a:rPr lang="en-GB" sz="1500" i="0" kern="1200" noProof="0"/>
+            <a:rPr lang="en-GB" sz="1500" i="0" kern="1200" noProof="0" dirty="0"/>
             <a:t> coke and hookers</a:t>
           </a:r>
         </a:p>
@@ -5702,7 +5702,7 @@
         <a:fontRef idx="minor"/>
       </dsp:style>
       <dsp:txBody>
-        <a:bodyPr spcFirstLastPara="0" vert="horz" wrap="square" lIns="0" tIns="88900" rIns="88900" bIns="133350" numCol="1" spcCol="1270" rtlCol="0" anchor="t" anchorCtr="0">
+        <a:bodyPr spcFirstLastPara="0" vert="horz" wrap="square" lIns="0" tIns="95250" rIns="95250" bIns="142875" numCol="1" spcCol="1270" rtlCol="0" anchor="t" anchorCtr="0">
           <a:noAutofit/>
         </a:bodyPr>
         <a:lstStyle/>
@@ -6377,11 +6377,11 @@
             <a:buNone/>
           </a:pPr>
           <a:r>
-            <a:rPr lang="en-GB" sz="1500" i="0" kern="1200" noProof="0"/>
+            <a:rPr lang="en-GB" sz="1500" i="0" kern="1200" noProof="0" dirty="0"/>
             <a:t>Cash-Money-Billionaire and exit </a:t>
           </a:r>
           <a:r>
-            <a:rPr lang="en-GB" sz="1500" i="0" kern="1200" noProof="0">
+            <a:rPr lang="en-GB" sz="1500" i="0" kern="1200" noProof="0" dirty="0">
               <a:solidFill>
                 <a:srgbClr val="000000">
                   <a:hueOff val="0"/>
@@ -6397,7 +6397,7 @@
             <a:t>with</a:t>
           </a:r>
           <a:r>
-            <a:rPr lang="en-GB" sz="1500" i="0" kern="1200" noProof="0"/>
+            <a:rPr lang="en-GB" sz="1500" i="0" kern="1200" noProof="0" dirty="0"/>
             <a:t> coke and hookers</a:t>
           </a:r>
         </a:p>
@@ -8940,7 +8940,7 @@
           <a:p>
             <a:fld id="{5BA41F70-3C9C-F642-B75A-6B3D1B659836}" type="slidenum">
               <a:rPr lang="en-US" smtClean="0"/>
-              <a:t>4</a:t>
+              <a:t>3</a:t>
             </a:fld>
             <a:endParaRPr lang="en-US"/>
           </a:p>
@@ -14054,104 +14054,6 @@
           <a:chExt cx="0" cy="0"/>
         </a:xfrm>
       </p:grpSpPr>
-      <p:sp>
-        <p:nvSpPr>
-          <p:cNvPr id="2" name="Titel 1">
-            <a:extLst>
-              <a:ext uri="{FF2B5EF4-FFF2-40B4-BE49-F238E27FC236}">
-                <a16:creationId xmlns:a16="http://schemas.microsoft.com/office/drawing/2014/main" id="{1151C34E-E852-4323-8A67-ADA5EE471913}"/>
-              </a:ext>
-            </a:extLst>
-          </p:cNvPr>
-          <p:cNvSpPr>
-            <a:spLocks noGrp="1"/>
-          </p:cNvSpPr>
-          <p:nvPr>
-            <p:ph type="title"/>
-          </p:nvPr>
-        </p:nvSpPr>
-        <p:spPr/>
-        <p:txBody>
-          <a:bodyPr/>
-          <a:lstStyle/>
-          <a:p>
-            <a:r>
-              <a:rPr lang="en-US"/>
-              <a:t>Expected objectives</a:t>
-            </a:r>
-          </a:p>
-        </p:txBody>
-      </p:sp>
-      <p:sp>
-        <p:nvSpPr>
-          <p:cNvPr id="3" name="Inhaltsplatzhalter 2">
-            <a:extLst>
-              <a:ext uri="{FF2B5EF4-FFF2-40B4-BE49-F238E27FC236}">
-                <a16:creationId xmlns:a16="http://schemas.microsoft.com/office/drawing/2014/main" id="{ABA6B69D-7BC5-45EA-B9A1-F02FECE716AA}"/>
-              </a:ext>
-            </a:extLst>
-          </p:cNvPr>
-          <p:cNvSpPr>
-            <a:spLocks noGrp="1"/>
-          </p:cNvSpPr>
-          <p:nvPr>
-            <p:ph idx="1"/>
-          </p:nvPr>
-        </p:nvSpPr>
-        <p:spPr/>
-        <p:txBody>
-          <a:bodyPr/>
-          <a:lstStyle/>
-          <a:p>
-            <a:r>
-              <a:rPr lang="en-US" dirty="0"/>
-              <a:t>Clear customer segment</a:t>
-            </a:r>
-          </a:p>
-          <a:p>
-            <a:r>
-              <a:rPr lang="en-US" dirty="0"/>
-              <a:t>Precise value proposition</a:t>
-            </a:r>
-          </a:p>
-          <a:p>
-            <a:r>
-              <a:rPr lang="en-US" dirty="0"/>
-              <a:t>Draft of Business Model </a:t>
-            </a:r>
-          </a:p>
-        </p:txBody>
-      </p:sp>
-    </p:spTree>
-    <p:extLst>
-      <p:ext uri="{BB962C8B-B14F-4D97-AF65-F5344CB8AC3E}">
-        <p14:creationId xmlns:p14="http://schemas.microsoft.com/office/powerpoint/2010/main" val="2502263574"/>
-      </p:ext>
-    </p:extLst>
-  </p:cSld>
-  <p:clrMapOvr>
-    <a:masterClrMapping/>
-  </p:clrMapOvr>
-</p:sld>
-</file>
-
-<file path=ppt/slides/slide4.xml><?xml version="1.0" encoding="utf-8"?>
-<p:sld xmlns:a="http://schemas.openxmlformats.org/drawingml/2006/main" xmlns:r="http://schemas.openxmlformats.org/officeDocument/2006/relationships" xmlns:p="http://schemas.openxmlformats.org/presentationml/2006/main">
-  <p:cSld>
-    <p:spTree>
-      <p:nvGrpSpPr>
-        <p:cNvPr id="1" name=""/>
-        <p:cNvGrpSpPr/>
-        <p:nvPr/>
-      </p:nvGrpSpPr>
-      <p:grpSpPr>
-        <a:xfrm>
-          <a:off x="0" y="0"/>
-          <a:ext cx="0" cy="0"/>
-          <a:chOff x="0" y="0"/>
-          <a:chExt cx="0" cy="0"/>
-        </a:xfrm>
-      </p:grpSpPr>
       <p:cxnSp>
         <p:nvCxnSpPr>
           <p:cNvPr id="3" name="Gerade Verbindung mit Pfeil 2">
@@ -14735,7 +14637,7 @@
         </p:nvSpPr>
         <p:spPr>
           <a:xfrm>
-            <a:off x="435097" y="2439900"/>
+            <a:off x="423762" y="2439900"/>
             <a:ext cx="6520655" cy="1107996"/>
           </a:xfrm>
           <a:prstGeom prst="rect">
@@ -14765,27 +14667,27 @@
             </a:pPr>
             <a:r>
               <a:rPr lang="en-US" sz="1600" dirty="0"/>
-              <a:t>What value proposition</a:t>
-            </a:r>
-          </a:p>
-          <a:p>
-            <a:pPr marL="742950" lvl="1" indent="-285750">
+              <a:t>Functions and Focus of Platform</a:t>
+            </a:r>
+          </a:p>
+          <a:p>
+            <a:pPr marL="1200150" lvl="2" indent="-285750">
               <a:buFont typeface="Arial" panose="020B0604020202020204" pitchFamily="34" charset="0"/>
               <a:buChar char="•"/>
             </a:pPr>
             <a:r>
               <a:rPr lang="en-US" sz="1600" dirty="0"/>
-              <a:t>Which kind of service</a:t>
-            </a:r>
-          </a:p>
-          <a:p>
-            <a:pPr marL="742950" lvl="1" indent="-285750">
+              <a:t>What value proposition</a:t>
+            </a:r>
+          </a:p>
+          <a:p>
+            <a:pPr marL="1200150" lvl="2" indent="-285750">
               <a:buFont typeface="Arial" panose="020B0604020202020204" pitchFamily="34" charset="0"/>
               <a:buChar char="•"/>
             </a:pPr>
             <a:r>
               <a:rPr lang="en-US" sz="1600" dirty="0"/>
-              <a:t>At which state</a:t>
+              <a:t>Which kind of service </a:t>
             </a:r>
           </a:p>
         </p:txBody>
@@ -14837,8 +14739,8 @@
         </p:nvSpPr>
         <p:spPr>
           <a:xfrm>
-            <a:off x="435097" y="3788447"/>
-            <a:ext cx="6520655" cy="615553"/>
+            <a:off x="423762" y="3647775"/>
+            <a:ext cx="6520655" cy="861774"/>
           </a:xfrm>
           <a:prstGeom prst="rect">
             <a:avLst/>
@@ -14867,7 +14769,17 @@
             </a:pPr>
             <a:r>
               <a:rPr lang="en-US" sz="1600" dirty="0"/>
-              <a:t>Broad idea to be the link between schools and industries </a:t>
+              <a:t>Link between schools and industries </a:t>
+            </a:r>
+          </a:p>
+          <a:p>
+            <a:pPr marL="742950" lvl="1" indent="-285750">
+              <a:buFont typeface="Arial" panose="020B0604020202020204" pitchFamily="34" charset="0"/>
+              <a:buChar char="•"/>
+            </a:pPr>
+            <a:r>
+              <a:rPr lang="en-US" sz="1600" dirty="0"/>
+              <a:t>Broad Idea of Platform</a:t>
             </a:r>
           </a:p>
         </p:txBody>
@@ -14886,7 +14798,7 @@
         </p:nvSpPr>
         <p:spPr>
           <a:xfrm>
-            <a:off x="412426" y="4644552"/>
+            <a:off x="423762" y="4644552"/>
             <a:ext cx="6520655" cy="1107996"/>
           </a:xfrm>
           <a:prstGeom prst="rect">
@@ -15208,7 +15120,7 @@
 </p:sld>
 </file>
 
-<file path=ppt/slides/slide5.xml><?xml version="1.0" encoding="utf-8"?>
+<file path=ppt/slides/slide4.xml><?xml version="1.0" encoding="utf-8"?>
 <p:sld xmlns:a="http://schemas.openxmlformats.org/drawingml/2006/main" xmlns:r="http://schemas.openxmlformats.org/officeDocument/2006/relationships" xmlns:p="http://schemas.openxmlformats.org/presentationml/2006/main">
   <p:cSld>
     <p:spTree>
@@ -15312,7 +15224,7 @@
 </p:sld>
 </file>
 
-<file path=ppt/slides/slide6.xml><?xml version="1.0" encoding="utf-8"?>
+<file path=ppt/slides/slide5.xml><?xml version="1.0" encoding="utf-8"?>
 <p:sld xmlns:a="http://schemas.openxmlformats.org/drawingml/2006/main" xmlns:r="http://schemas.openxmlformats.org/officeDocument/2006/relationships" xmlns:p="http://schemas.openxmlformats.org/presentationml/2006/main">
   <p:cSld>
     <p:spTree>
@@ -15480,7 +15392,7 @@
             <a:pPr algn="ctr"/>
             <a:r>
               <a:rPr lang="en-US" sz="2800" dirty="0"/>
-              <a:t>Business Prototype</a:t>
+              <a:t>Platform Prototype</a:t>
             </a:r>
             <a:endParaRPr lang="en-US" dirty="0"/>
           </a:p>
@@ -15541,8 +15453,8 @@
         </p:nvSpPr>
         <p:spPr>
           <a:xfrm>
-            <a:off x="7993209" y="3644059"/>
-            <a:ext cx="1559333" cy="523220"/>
+            <a:off x="8060236" y="3471589"/>
+            <a:ext cx="1559333" cy="954107"/>
           </a:xfrm>
           <a:prstGeom prst="rect">
             <a:avLst/>
@@ -15558,7 +15470,58 @@
             <a:pPr algn="ctr"/>
             <a:r>
               <a:rPr lang="en-US" sz="2800" dirty="0"/>
+              <a:t>CI/CD</a:t>
+            </a:r>
+          </a:p>
+          <a:p>
+            <a:pPr algn="ctr"/>
+            <a:r>
+              <a:rPr lang="en-US" sz="2800" dirty="0"/>
               <a:t>Services</a:t>
+            </a:r>
+            <a:endParaRPr lang="en-US" dirty="0"/>
+          </a:p>
+        </p:txBody>
+      </p:sp>
+      <p:sp>
+        <p:nvSpPr>
+          <p:cNvPr id="8" name="Textfeld 4">
+            <a:extLst>
+              <a:ext uri="{FF2B5EF4-FFF2-40B4-BE49-F238E27FC236}">
+                <a16:creationId xmlns:a16="http://schemas.microsoft.com/office/drawing/2014/main" id="{966AADE1-E224-4490-9B8A-EB04F1B31D4A}"/>
+              </a:ext>
+            </a:extLst>
+          </p:cNvPr>
+          <p:cNvSpPr txBox="1"/>
+          <p:nvPr/>
+        </p:nvSpPr>
+        <p:spPr>
+          <a:xfrm>
+            <a:off x="2736860" y="3458495"/>
+            <a:ext cx="1771479" cy="954107"/>
+          </a:xfrm>
+          <a:prstGeom prst="rect">
+            <a:avLst/>
+          </a:prstGeom>
+          <a:noFill/>
+        </p:spPr>
+        <p:txBody>
+          <a:bodyPr wrap="square" rtlCol="0">
+            <a:spAutoFit/>
+          </a:bodyPr>
+          <a:lstStyle/>
+          <a:p>
+            <a:pPr algn="ctr"/>
+            <a:r>
+              <a:rPr lang="en-US" sz="2800" dirty="0"/>
+              <a:t>Business</a:t>
+            </a:r>
+          </a:p>
+          <a:p>
+            <a:pPr algn="ctr"/>
+            <a:r>
+              <a:rPr lang="en-US" sz="2800" dirty="0"/>
+              <a:t>Model</a:t>
             </a:r>
             <a:endParaRPr lang="en-US" dirty="0"/>
           </a:p>
@@ -15568,6 +15531,158 @@
     <p:extLst>
       <p:ext uri="{BB962C8B-B14F-4D97-AF65-F5344CB8AC3E}">
         <p14:creationId xmlns:p14="http://schemas.microsoft.com/office/powerpoint/2010/main" val="2653807472"/>
+      </p:ext>
+    </p:extLst>
+  </p:cSld>
+  <p:clrMapOvr>
+    <a:masterClrMapping/>
+  </p:clrMapOvr>
+</p:sld>
+</file>
+
+<file path=ppt/slides/slide6.xml><?xml version="1.0" encoding="utf-8"?>
+<p:sld xmlns:a="http://schemas.openxmlformats.org/drawingml/2006/main" xmlns:r="http://schemas.openxmlformats.org/officeDocument/2006/relationships" xmlns:p="http://schemas.openxmlformats.org/presentationml/2006/main">
+  <p:cSld>
+    <p:spTree>
+      <p:nvGrpSpPr>
+        <p:cNvPr id="1" name=""/>
+        <p:cNvGrpSpPr/>
+        <p:nvPr/>
+      </p:nvGrpSpPr>
+      <p:grpSpPr>
+        <a:xfrm>
+          <a:off x="0" y="0"/>
+          <a:ext cx="0" cy="0"/>
+          <a:chOff x="0" y="0"/>
+          <a:chExt cx="0" cy="0"/>
+        </a:xfrm>
+      </p:grpSpPr>
+      <p:sp>
+        <p:nvSpPr>
+          <p:cNvPr id="2" name="Titel 1">
+            <a:extLst>
+              <a:ext uri="{FF2B5EF4-FFF2-40B4-BE49-F238E27FC236}">
+                <a16:creationId xmlns:a16="http://schemas.microsoft.com/office/drawing/2014/main" id="{1151C34E-E852-4323-8A67-ADA5EE471913}"/>
+              </a:ext>
+            </a:extLst>
+          </p:cNvPr>
+          <p:cNvSpPr>
+            <a:spLocks noGrp="1"/>
+          </p:cNvSpPr>
+          <p:nvPr>
+            <p:ph type="title"/>
+          </p:nvPr>
+        </p:nvSpPr>
+        <p:spPr/>
+        <p:txBody>
+          <a:bodyPr/>
+          <a:lstStyle/>
+          <a:p>
+            <a:r>
+              <a:rPr lang="en-US"/>
+              <a:t>Expected objectives</a:t>
+            </a:r>
+          </a:p>
+        </p:txBody>
+      </p:sp>
+      <p:sp>
+        <p:nvSpPr>
+          <p:cNvPr id="3" name="Inhaltsplatzhalter 2">
+            <a:extLst>
+              <a:ext uri="{FF2B5EF4-FFF2-40B4-BE49-F238E27FC236}">
+                <a16:creationId xmlns:a16="http://schemas.microsoft.com/office/drawing/2014/main" id="{ABA6B69D-7BC5-45EA-B9A1-F02FECE716AA}"/>
+              </a:ext>
+            </a:extLst>
+          </p:cNvPr>
+          <p:cNvSpPr>
+            <a:spLocks noGrp="1"/>
+          </p:cNvSpPr>
+          <p:nvPr>
+            <p:ph idx="1"/>
+          </p:nvPr>
+        </p:nvSpPr>
+        <p:spPr>
+          <a:xfrm>
+            <a:off x="2231136" y="2647569"/>
+            <a:ext cx="7729728" cy="3562731"/>
+          </a:xfrm>
+        </p:spPr>
+        <p:txBody>
+          <a:bodyPr>
+            <a:normAutofit/>
+          </a:bodyPr>
+          <a:lstStyle/>
+          <a:p>
+            <a:pPr marL="0" indent="0">
+              <a:buNone/>
+            </a:pPr>
+            <a:r>
+              <a:rPr lang="en-US" dirty="0"/>
+              <a:t>Design Thinking Iteration</a:t>
+            </a:r>
+          </a:p>
+          <a:p>
+            <a:r>
+              <a:rPr lang="en-US" dirty="0"/>
+              <a:t>Business Model </a:t>
+            </a:r>
+          </a:p>
+          <a:p>
+            <a:pPr lvl="1"/>
+            <a:r>
+              <a:rPr lang="en-US" dirty="0"/>
+              <a:t>Customer Segment</a:t>
+            </a:r>
+          </a:p>
+          <a:p>
+            <a:pPr lvl="1"/>
+            <a:r>
+              <a:rPr lang="en-US" dirty="0"/>
+              <a:t>Value Proposition</a:t>
+            </a:r>
+          </a:p>
+          <a:p>
+            <a:pPr marL="0" indent="0">
+              <a:buNone/>
+            </a:pPr>
+            <a:r>
+              <a:rPr lang="en-US" dirty="0"/>
+              <a:t>Agile Cycles</a:t>
+            </a:r>
+          </a:p>
+          <a:p>
+            <a:r>
+              <a:rPr lang="en-US" dirty="0"/>
+              <a:t>Platform Prototype</a:t>
+            </a:r>
+          </a:p>
+          <a:p>
+            <a:pPr lvl="1"/>
+            <a:r>
+              <a:rPr lang="en-US" dirty="0"/>
+              <a:t>High-Level Requirements </a:t>
+            </a:r>
+          </a:p>
+          <a:p>
+            <a:pPr lvl="1"/>
+            <a:r>
+              <a:rPr lang="en-US" dirty="0"/>
+              <a:t>High-Level Designs / Mock-Ups </a:t>
+            </a:r>
+          </a:p>
+          <a:p>
+            <a:pPr lvl="1"/>
+            <a:r>
+              <a:rPr lang="en-US" dirty="0"/>
+              <a:t>Testing</a:t>
+            </a:r>
+          </a:p>
+        </p:txBody>
+      </p:sp>
+    </p:spTree>
+    <p:extLst>
+      <p:ext uri="{BB962C8B-B14F-4D97-AF65-F5344CB8AC3E}">
+        <p14:creationId xmlns:p14="http://schemas.microsoft.com/office/powerpoint/2010/main" val="2502263574"/>
       </p:ext>
     </p:extLst>
   </p:cSld>
@@ -18538,12 +18653,9 @@
 </file>
 
 <file path=customXml/item1.xml><?xml version="1.0" encoding="utf-8"?>
-<?mso-contentType ?>
-<FormTemplates xmlns="http://schemas.microsoft.com/sharepoint/v3/contenttype/forms">
-  <Display>DocumentLibraryForm</Display>
-  <Edit>DocumentLibraryForm</Edit>
-  <New>DocumentLibraryForm</New>
-</FormTemplates>
+<p:properties xmlns:p="http://schemas.microsoft.com/office/2006/metadata/properties" xmlns:xsi="http://www.w3.org/2001/XMLSchema-instance" xmlns:pc="http://schemas.microsoft.com/office/infopath/2007/PartnerControls">
+  <documentManagement/>
+</p:properties>
 </file>
 
 <file path=customXml/item2.xml><?xml version="1.0" encoding="utf-8"?>
@@ -18705,15 +18817,26 @@
 </file>
 
 <file path=customXml/item3.xml><?xml version="1.0" encoding="utf-8"?>
-<p:properties xmlns:p="http://schemas.microsoft.com/office/2006/metadata/properties" xmlns:xsi="http://www.w3.org/2001/XMLSchema-instance" xmlns:pc="http://schemas.microsoft.com/office/infopath/2007/PartnerControls">
-  <documentManagement/>
-</p:properties>
+<?mso-contentType ?>
+<FormTemplates xmlns="http://schemas.microsoft.com/sharepoint/v3/contenttype/forms">
+  <Display>DocumentLibraryForm</Display>
+  <Edit>DocumentLibraryForm</Edit>
+  <New>DocumentLibraryForm</New>
+</FormTemplates>
 </file>
 
 <file path=customXml/itemProps1.xml><?xml version="1.0" encoding="utf-8"?>
-<ds:datastoreItem xmlns:ds="http://schemas.openxmlformats.org/officeDocument/2006/customXml" ds:itemID="{7A5E0DA6-A53B-414E-84F5-AC270393C02C}">
+<ds:datastoreItem xmlns:ds="http://schemas.openxmlformats.org/officeDocument/2006/customXml" ds:itemID="{2018834A-984F-461F-AA51-A4857E6AAEC4}">
   <ds:schemaRefs>
-    <ds:schemaRef ds:uri="http://schemas.microsoft.com/sharepoint/v3/contenttype/forms"/>
+    <ds:schemaRef ds:uri="http://purl.org/dc/terms/"/>
+    <ds:schemaRef ds:uri="http://purl.org/dc/elements/1.1/"/>
+    <ds:schemaRef ds:uri="http://www.w3.org/XML/1998/namespace"/>
+    <ds:schemaRef ds:uri="http://schemas.openxmlformats.org/package/2006/metadata/core-properties"/>
+    <ds:schemaRef ds:uri="http://schemas.microsoft.com/office/2006/documentManagement/types"/>
+    <ds:schemaRef ds:uri="http://schemas.microsoft.com/office/2006/metadata/properties"/>
+    <ds:schemaRef ds:uri="http://purl.org/dc/dcmitype/"/>
+    <ds:schemaRef ds:uri="http://schemas.microsoft.com/office/infopath/2007/PartnerControls"/>
+    <ds:schemaRef ds:uri="dcd3b7ff-f528-4170-a52f-e83b844e5d81"/>
   </ds:schemaRefs>
 </ds:datastoreItem>
 </file>
@@ -18737,17 +18860,9 @@
 </file>
 
 <file path=customXml/itemProps3.xml><?xml version="1.0" encoding="utf-8"?>
-<ds:datastoreItem xmlns:ds="http://schemas.openxmlformats.org/officeDocument/2006/customXml" ds:itemID="{2018834A-984F-461F-AA51-A4857E6AAEC4}">
+<ds:datastoreItem xmlns:ds="http://schemas.openxmlformats.org/officeDocument/2006/customXml" ds:itemID="{7A5E0DA6-A53B-414E-84F5-AC270393C02C}">
   <ds:schemaRefs>
-    <ds:schemaRef ds:uri="http://purl.org/dc/terms/"/>
-    <ds:schemaRef ds:uri="http://purl.org/dc/elements/1.1/"/>
-    <ds:schemaRef ds:uri="http://www.w3.org/XML/1998/namespace"/>
-    <ds:schemaRef ds:uri="http://schemas.openxmlformats.org/package/2006/metadata/core-properties"/>
-    <ds:schemaRef ds:uri="http://schemas.microsoft.com/office/2006/documentManagement/types"/>
-    <ds:schemaRef ds:uri="http://schemas.microsoft.com/office/2006/metadata/properties"/>
-    <ds:schemaRef ds:uri="http://purl.org/dc/dcmitype/"/>
-    <ds:schemaRef ds:uri="http://schemas.microsoft.com/office/infopath/2007/PartnerControls"/>
-    <ds:schemaRef ds:uri="dcd3b7ff-f528-4170-a52f-e83b844e5d81"/>
+    <ds:schemaRef ds:uri="http://schemas.microsoft.com/sharepoint/v3/contenttype/forms"/>
   </ds:schemaRefs>
 </ds:datastoreItem>
 </file>
</xml_diff>

<commit_message>
Updated Notes in Presi
</commit_message>
<xml_diff>
--- a/Agile Business Analysis Pitch.pptx
+++ b/Agile Business Analysis Pitch.pptx
@@ -4058,18 +4058,18 @@
     <dgm:cxn modelId="{6078B11C-591F-47B2-BC1B-3C8B09648FA9}" srcId="{3CB04A44-4013-4CA7-90FD-29AFC3C15E37}" destId="{F553BF37-AF46-41C0-9437-F96C86AC38B6}" srcOrd="0" destOrd="0" parTransId="{796F4D9A-7756-46E6-9170-DA2BD44EF53D}" sibTransId="{B7107BC7-D178-4532-B223-77EBF3F241F9}"/>
     <dgm:cxn modelId="{146C3436-7349-460D-8FAF-B5C22B68A41F}" type="presOf" srcId="{CA6B1BA0-B2FC-48AD-8EDA-F4AAA4AF2782}" destId="{3DA36ABE-9810-4ED4-9A55-2905E7588D06}" srcOrd="0" destOrd="0" presId="urn:microsoft.com/office/officeart/2017/3/layout/DropPinTimeline"/>
     <dgm:cxn modelId="{991E153C-2D4A-4089-A3BB-23D6CF24990F}" type="presOf" srcId="{683CC5F6-E9B5-49F2-909E-A68D38896308}" destId="{4EB3AA5C-1289-44C6-9F3E-859ABA28E18F}" srcOrd="0" destOrd="0" presId="urn:microsoft.com/office/officeart/2017/3/layout/DropPinTimeline"/>
+    <dgm:cxn modelId="{E4469D45-E897-415B-A682-716414212B34}" type="presOf" srcId="{1E529C6E-C939-479A-A075-9E9B02837B50}" destId="{5C5070CD-E29E-4F50-9A43-342A2DE968FF}" srcOrd="0" destOrd="0" presId="urn:microsoft.com/office/officeart/2017/3/layout/DropPinTimeline"/>
+    <dgm:cxn modelId="{2841EC4D-F3DC-4972-B897-89C9EA062B26}" type="presOf" srcId="{92921081-529B-4D1C-83A4-C416BB4C5224}" destId="{B608C5A1-CE9E-4410-9F2F-F714CC6AB069}" srcOrd="0" destOrd="0" presId="urn:microsoft.com/office/officeart/2017/3/layout/DropPinTimeline"/>
+    <dgm:cxn modelId="{3C15AF51-54A6-4ED0-824A-52A4CE5468AB}" type="presOf" srcId="{2AEE5C11-34AE-4EB7-8907-9BED418EA471}" destId="{D1646913-A3FA-4470-A3E9-C64B0A13A62A}" srcOrd="0" destOrd="0" presId="urn:microsoft.com/office/officeart/2017/3/layout/DropPinTimeline"/>
+    <dgm:cxn modelId="{24A8F052-3377-4BA4-8C62-CCF5039C85D7}" srcId="{63085546-7C7C-4B3E-ABEB-2669F1A65FB2}" destId="{3CB04A44-4013-4CA7-90FD-29AFC3C15E37}" srcOrd="4" destOrd="0" parTransId="{ECEE936A-E3CC-4209-BECC-1CD0C85A2B72}" sibTransId="{D7A8F7A0-47A3-4464-B3B7-E0806DF46627}"/>
+    <dgm:cxn modelId="{761E4B58-8AA0-4EE9-9827-01A0CA5D8AAC}" type="presOf" srcId="{9DCEA5FC-4640-45AF-B712-7A4FD94AEF0D}" destId="{85C50C56-6DC8-4C47-8DBC-4FD6B1554AA4}" srcOrd="0" destOrd="0" presId="urn:microsoft.com/office/officeart/2017/3/layout/DropPinTimeline"/>
     <dgm:cxn modelId="{39A11E5C-7A57-4117-A6DF-36000C29509C}" srcId="{9DCEA5FC-4640-45AF-B712-7A4FD94AEF0D}" destId="{831701CF-77C7-46C0-A913-8CC39517BAB8}" srcOrd="0" destOrd="0" parTransId="{13FBC60D-3EA6-4496-BA97-C1AE8C7F8961}" sibTransId="{75156CDF-E17B-4DAD-AE37-EA44D7F37090}"/>
     <dgm:cxn modelId="{DD687B5C-28C8-4088-99B8-D375C5FDAE4A}" srcId="{212ADAAB-D5CB-4BBC-8DAF-7340FD334994}" destId="{2AEE5C11-34AE-4EB7-8907-9BED418EA471}" srcOrd="0" destOrd="0" parTransId="{2E14AD1F-C7EA-45AE-ADC0-0EE92A6516CB}" sibTransId="{F36FDDA0-6B91-47CB-8114-B6F076E55FC8}"/>
-    <dgm:cxn modelId="{E4469D45-E897-415B-A682-716414212B34}" type="presOf" srcId="{1E529C6E-C939-479A-A075-9E9B02837B50}" destId="{5C5070CD-E29E-4F50-9A43-342A2DE968FF}" srcOrd="0" destOrd="0" presId="urn:microsoft.com/office/officeart/2017/3/layout/DropPinTimeline"/>
     <dgm:cxn modelId="{DBD99269-D7F7-4B47-B17B-A5AE402751D9}" srcId="{63085546-7C7C-4B3E-ABEB-2669F1A65FB2}" destId="{9DCEA5FC-4640-45AF-B712-7A4FD94AEF0D}" srcOrd="0" destOrd="0" parTransId="{929A5FD9-0612-4B79-9B59-C3C36D34A069}" sibTransId="{0A99745B-BB5C-49B3-A782-8DB57641F6C9}"/>
     <dgm:cxn modelId="{C8C7266C-2A0C-476A-85B3-F12BE2521F4C}" srcId="{63085546-7C7C-4B3E-ABEB-2669F1A65FB2}" destId="{212ADAAB-D5CB-4BBC-8DAF-7340FD334994}" srcOrd="5" destOrd="0" parTransId="{45F6D312-A686-491E-95E3-EFB9640CC472}" sibTransId="{AB2787E4-2A8B-428D-A4AE-2B14DCFFC4E7}"/>
     <dgm:cxn modelId="{F674CD6D-2BFC-44FF-95F5-DE381A91BC39}" type="presOf" srcId="{1AD22451-A99E-4E4A-824F-4EA5754EE73F}" destId="{FE564261-183D-47F9-8E7E-BCFC5023A815}" srcOrd="0" destOrd="0" presId="urn:microsoft.com/office/officeart/2017/3/layout/DropPinTimeline"/>
-    <dgm:cxn modelId="{2841EC4D-F3DC-4972-B897-89C9EA062B26}" type="presOf" srcId="{92921081-529B-4D1C-83A4-C416BB4C5224}" destId="{B608C5A1-CE9E-4410-9F2F-F714CC6AB069}" srcOrd="0" destOrd="0" presId="urn:microsoft.com/office/officeart/2017/3/layout/DropPinTimeline"/>
-    <dgm:cxn modelId="{3C15AF51-54A6-4ED0-824A-52A4CE5468AB}" type="presOf" srcId="{2AEE5C11-34AE-4EB7-8907-9BED418EA471}" destId="{D1646913-A3FA-4470-A3E9-C64B0A13A62A}" srcOrd="0" destOrd="0" presId="urn:microsoft.com/office/officeart/2017/3/layout/DropPinTimeline"/>
-    <dgm:cxn modelId="{24A8F052-3377-4BA4-8C62-CCF5039C85D7}" srcId="{63085546-7C7C-4B3E-ABEB-2669F1A65FB2}" destId="{3CB04A44-4013-4CA7-90FD-29AFC3C15E37}" srcOrd="4" destOrd="0" parTransId="{ECEE936A-E3CC-4209-BECC-1CD0C85A2B72}" sibTransId="{D7A8F7A0-47A3-4464-B3B7-E0806DF46627}"/>
     <dgm:cxn modelId="{601FA375-B804-4895-B969-A3CE7B37C85C}" type="presOf" srcId="{096A9AF0-0DAE-4EB3-B448-4501DA034F4A}" destId="{C1E34084-406C-48D5-88FE-7226282DBC49}" srcOrd="0" destOrd="0" presId="urn:microsoft.com/office/officeart/2017/3/layout/DropPinTimeline"/>
     <dgm:cxn modelId="{F83DF077-A6DE-4B8C-A62E-2FB10C7306B7}" type="presOf" srcId="{4EA069F3-397F-40D5-94A6-32C3E355C277}" destId="{FC8603F2-85FC-4134-978C-4054E468209C}" srcOrd="0" destOrd="0" presId="urn:microsoft.com/office/officeart/2017/3/layout/DropPinTimeline"/>
-    <dgm:cxn modelId="{761E4B58-8AA0-4EE9-9827-01A0CA5D8AAC}" type="presOf" srcId="{9DCEA5FC-4640-45AF-B712-7A4FD94AEF0D}" destId="{85C50C56-6DC8-4C47-8DBC-4FD6B1554AA4}" srcOrd="0" destOrd="0" presId="urn:microsoft.com/office/officeart/2017/3/layout/DropPinTimeline"/>
     <dgm:cxn modelId="{B05C4C7C-FEB8-4825-98A0-C38D3021918A}" srcId="{096A9AF0-0DAE-4EB3-B448-4501DA034F4A}" destId="{92921081-529B-4D1C-83A4-C416BB4C5224}" srcOrd="0" destOrd="0" parTransId="{5AD2C2F8-A1D7-469B-93D8-B578BEFE51F8}" sibTransId="{ECC13403-1F53-4ED4-AE4F-334EEC7C8710}"/>
     <dgm:cxn modelId="{F9D8B584-9399-4A2B-8ADC-F71293A4822C}" srcId="{63085546-7C7C-4B3E-ABEB-2669F1A65FB2}" destId="{A2560FD2-F12F-4A06-A96F-B86674952111}" srcOrd="6" destOrd="0" parTransId="{96173659-138A-4A00-AE0B-9063EA9393A6}" sibTransId="{D3C3BC3F-2256-4FBC-AFA5-0D035E3EACD7}"/>
     <dgm:cxn modelId="{247DE591-0579-4FF5-9C62-940C4F67096B}" type="presOf" srcId="{63085546-7C7C-4B3E-ABEB-2669F1A65FB2}" destId="{7A5D3400-AF5B-4297-8592-4C1EDB9D0973}" srcOrd="0" destOrd="0" presId="urn:microsoft.com/office/officeart/2017/3/layout/DropPinTimeline"/>
@@ -8486,7 +8486,7 @@
           <a:p>
             <a:fld id="{B7C5E90C-C242-9C44-A150-FFB6D0845D84}" type="datetimeFigureOut">
               <a:rPr lang="en-US" smtClean="0"/>
-              <a:t>10/4/2019</a:t>
+              <a:t>10/4/19</a:t>
             </a:fld>
             <a:endParaRPr lang="en-US"/>
           </a:p>
@@ -8798,6 +8798,157 @@
           <a:bodyPr/>
           <a:lstStyle/>
           <a:p>
+            <a:r>
+              <a:rPr lang="en-US" dirty="0"/>
+              <a:t>-  Students Search</a:t>
+            </a:r>
+          </a:p>
+          <a:p>
+            <a:pPr marL="171450" indent="-171450">
+              <a:buFontTx/>
+              <a:buChar char="-"/>
+            </a:pPr>
+            <a:r>
+              <a:rPr lang="en-US" dirty="0"/>
+              <a:t>Companies Need</a:t>
+            </a:r>
+          </a:p>
+          <a:p>
+            <a:pPr marL="171450" indent="-171450">
+              <a:buFontTx/>
+              <a:buChar char="-"/>
+            </a:pPr>
+            <a:r>
+              <a:rPr lang="en-US" b="1" dirty="0"/>
+              <a:t>Opportunity</a:t>
+            </a:r>
+          </a:p>
+          <a:p>
+            <a:pPr marL="171450" indent="-171450">
+              <a:buFontTx/>
+              <a:buChar char="-"/>
+            </a:pPr>
+            <a:endParaRPr lang="en-US" dirty="0"/>
+          </a:p>
+          <a:p>
+            <a:pPr marL="171450" indent="-171450">
+              <a:buFontTx/>
+              <a:buChar char="-"/>
+            </a:pPr>
+            <a:r>
+              <a:rPr lang="en-US" dirty="0"/>
+              <a:t>Interface</a:t>
+            </a:r>
+          </a:p>
+          <a:p>
+            <a:pPr marL="171450" indent="-171450">
+              <a:buFontTx/>
+              <a:buChar char="-"/>
+            </a:pPr>
+            <a:r>
+              <a:rPr lang="en-US" dirty="0"/>
+              <a:t>Middleman</a:t>
+            </a:r>
+          </a:p>
+          <a:p>
+            <a:pPr marL="171450" indent="-171450">
+              <a:buFontTx/>
+              <a:buChar char="-"/>
+            </a:pPr>
+            <a:r>
+              <a:rPr lang="en-US" b="1" dirty="0"/>
+              <a:t>Prerequisite</a:t>
+            </a:r>
+          </a:p>
+          <a:p>
+            <a:pPr marL="171450" indent="-171450">
+              <a:buFontTx/>
+              <a:buChar char="-"/>
+            </a:pPr>
+            <a:endParaRPr lang="en-US" dirty="0"/>
+          </a:p>
+        </p:txBody>
+      </p:sp>
+      <p:sp>
+        <p:nvSpPr>
+          <p:cNvPr id="4" name="Slide Number Placeholder 3"/>
+          <p:cNvSpPr>
+            <a:spLocks noGrp="1"/>
+          </p:cNvSpPr>
+          <p:nvPr>
+            <p:ph type="sldNum" sz="quarter" idx="5"/>
+          </p:nvPr>
+        </p:nvSpPr>
+        <p:spPr/>
+        <p:txBody>
+          <a:bodyPr/>
+          <a:lstStyle/>
+          <a:p>
+            <a:fld id="{5BA41F70-3C9C-F642-B75A-6B3D1B659836}" type="slidenum">
+              <a:rPr lang="en-US" smtClean="0"/>
+              <a:t>2</a:t>
+            </a:fld>
+            <a:endParaRPr lang="en-US"/>
+          </a:p>
+        </p:txBody>
+      </p:sp>
+    </p:spTree>
+    <p:extLst>
+      <p:ext uri="{BB962C8B-B14F-4D97-AF65-F5344CB8AC3E}">
+        <p14:creationId xmlns:p14="http://schemas.microsoft.com/office/powerpoint/2010/main" val="3106647777"/>
+      </p:ext>
+    </p:extLst>
+  </p:cSld>
+  <p:clrMapOvr>
+    <a:masterClrMapping/>
+  </p:clrMapOvr>
+</p:notes>
+</file>
+
+<file path=ppt/notesSlides/notesSlide2.xml><?xml version="1.0" encoding="utf-8"?>
+<p:notes xmlns:a="http://schemas.openxmlformats.org/drawingml/2006/main" xmlns:r="http://schemas.openxmlformats.org/officeDocument/2006/relationships" xmlns:p="http://schemas.openxmlformats.org/presentationml/2006/main">
+  <p:cSld>
+    <p:spTree>
+      <p:nvGrpSpPr>
+        <p:cNvPr id="1" name=""/>
+        <p:cNvGrpSpPr/>
+        <p:nvPr/>
+      </p:nvGrpSpPr>
+      <p:grpSpPr>
+        <a:xfrm>
+          <a:off x="0" y="0"/>
+          <a:ext cx="0" cy="0"/>
+          <a:chOff x="0" y="0"/>
+          <a:chExt cx="0" cy="0"/>
+        </a:xfrm>
+      </p:grpSpPr>
+      <p:sp>
+        <p:nvSpPr>
+          <p:cNvPr id="2" name="Slide Image Placeholder 1"/>
+          <p:cNvSpPr>
+            <a:spLocks noGrp="1" noRot="1" noChangeAspect="1"/>
+          </p:cNvSpPr>
+          <p:nvPr>
+            <p:ph type="sldImg"/>
+          </p:nvPr>
+        </p:nvSpPr>
+        <p:spPr/>
+      </p:sp>
+      <p:sp>
+        <p:nvSpPr>
+          <p:cNvPr id="3" name="Notes Placeholder 2"/>
+          <p:cNvSpPr>
+            <a:spLocks noGrp="1"/>
+          </p:cNvSpPr>
+          <p:nvPr>
+            <p:ph type="body" idx="1"/>
+          </p:nvPr>
+        </p:nvSpPr>
+        <p:spPr/>
+        <p:txBody>
+          <a:bodyPr/>
+          <a:lstStyle/>
+          <a:p>
             <a:pPr marL="285750" indent="-285750">
               <a:buFont typeface="Arial" panose="020B0604020202020204" pitchFamily="34" charset="0"/>
               <a:buChar char="•"/>
@@ -9122,7 +9273,7 @@
           <a:p>
             <a:fld id="{846CE7D5-CF57-46EF-B807-FDD0502418D4}" type="datetimeFigureOut">
               <a:rPr lang="en-US" smtClean="0"/>
-              <a:t>10/4/2019</a:t>
+              <a:t>10/4/19</a:t>
             </a:fld>
             <a:endParaRPr lang="en-US"/>
           </a:p>
@@ -9292,7 +9443,7 @@
           <a:p>
             <a:fld id="{846CE7D5-CF57-46EF-B807-FDD0502418D4}" type="datetimeFigureOut">
               <a:rPr lang="en-US" smtClean="0"/>
-              <a:t>10/4/2019</a:t>
+              <a:t>10/4/19</a:t>
             </a:fld>
             <a:endParaRPr lang="en-US"/>
           </a:p>
@@ -9472,7 +9623,7 @@
           <a:p>
             <a:fld id="{846CE7D5-CF57-46EF-B807-FDD0502418D4}" type="datetimeFigureOut">
               <a:rPr lang="en-US" smtClean="0"/>
-              <a:t>10/4/2019</a:t>
+              <a:t>10/4/19</a:t>
             </a:fld>
             <a:endParaRPr lang="en-US"/>
           </a:p>
@@ -9642,7 +9793,7 @@
           <a:p>
             <a:fld id="{846CE7D5-CF57-46EF-B807-FDD0502418D4}" type="datetimeFigureOut">
               <a:rPr lang="en-US" smtClean="0"/>
-              <a:t>10/4/2019</a:t>
+              <a:t>10/4/19</a:t>
             </a:fld>
             <a:endParaRPr lang="en-US"/>
           </a:p>
@@ -9910,7 +10061,7 @@
           <a:p>
             <a:fld id="{846CE7D5-CF57-46EF-B807-FDD0502418D4}" type="datetimeFigureOut">
               <a:rPr lang="en-US" smtClean="0"/>
-              <a:t>10/4/2019</a:t>
+              <a:t>10/4/19</a:t>
             </a:fld>
             <a:endParaRPr lang="en-US"/>
           </a:p>
@@ -10142,7 +10293,7 @@
           <a:p>
             <a:fld id="{846CE7D5-CF57-46EF-B807-FDD0502418D4}" type="datetimeFigureOut">
               <a:rPr lang="en-US" smtClean="0"/>
-              <a:t>10/4/2019</a:t>
+              <a:t>10/4/19</a:t>
             </a:fld>
             <a:endParaRPr lang="en-US"/>
           </a:p>
@@ -10501,7 +10652,7 @@
           <a:p>
             <a:fld id="{846CE7D5-CF57-46EF-B807-FDD0502418D4}" type="datetimeFigureOut">
               <a:rPr lang="en-US" smtClean="0"/>
-              <a:t>10/4/2019</a:t>
+              <a:t>10/4/19</a:t>
             </a:fld>
             <a:endParaRPr lang="en-US"/>
           </a:p>
@@ -10642,7 +10793,7 @@
           <a:p>
             <a:fld id="{846CE7D5-CF57-46EF-B807-FDD0502418D4}" type="datetimeFigureOut">
               <a:rPr lang="en-US" smtClean="0"/>
-              <a:t>10/4/2019</a:t>
+              <a:t>10/4/19</a:t>
             </a:fld>
             <a:endParaRPr lang="en-US"/>
           </a:p>
@@ -10737,7 +10888,7 @@
           <a:p>
             <a:fld id="{846CE7D5-CF57-46EF-B807-FDD0502418D4}" type="datetimeFigureOut">
               <a:rPr lang="en-US" smtClean="0"/>
-              <a:t>10/4/2019</a:t>
+              <a:t>10/4/19</a:t>
             </a:fld>
             <a:endParaRPr lang="en-US"/>
           </a:p>
@@ -11094,7 +11245,7 @@
           <a:p>
             <a:fld id="{846CE7D5-CF57-46EF-B807-FDD0502418D4}" type="datetimeFigureOut">
               <a:rPr lang="en-US" smtClean="0"/>
-              <a:t>10/4/2019</a:t>
+              <a:t>10/4/19</a:t>
             </a:fld>
             <a:endParaRPr lang="en-US"/>
           </a:p>
@@ -11451,7 +11602,7 @@
           <a:p>
             <a:fld id="{846CE7D5-CF57-46EF-B807-FDD0502418D4}" type="datetimeFigureOut">
               <a:rPr lang="en-US" smtClean="0"/>
-              <a:t>10/4/2019</a:t>
+              <a:t>10/4/19</a:t>
             </a:fld>
             <a:endParaRPr lang="en-US"/>
           </a:p>
@@ -11693,7 +11844,7 @@
           <a:p>
             <a:fld id="{846CE7D5-CF57-46EF-B807-FDD0502418D4}" type="datetimeFigureOut">
               <a:rPr lang="en-US" smtClean="0"/>
-              <a:t>10/4/2019</a:t>
+              <a:t>10/4/19</a:t>
             </a:fld>
             <a:endParaRPr lang="en-US"/>
           </a:p>
@@ -18653,12 +18804,6 @@
 </file>
 
 <file path=customXml/item1.xml><?xml version="1.0" encoding="utf-8"?>
-<p:properties xmlns:p="http://schemas.microsoft.com/office/2006/metadata/properties" xmlns:xsi="http://www.w3.org/2001/XMLSchema-instance" xmlns:pc="http://schemas.microsoft.com/office/infopath/2007/PartnerControls">
-  <documentManagement/>
-</p:properties>
-</file>
-
-<file path=customXml/item2.xml><?xml version="1.0" encoding="utf-8"?>
 <ct:contentTypeSchema xmlns:ct="http://schemas.microsoft.com/office/2006/metadata/contentType" xmlns:ma="http://schemas.microsoft.com/office/2006/metadata/properties/metaAttributes" ct:_="" ma:_="" ma:contentTypeName="Document" ma:contentTypeID="0x010100A819C105D7E31046BC4F809853EC8C0E" ma:contentTypeVersion="6" ma:contentTypeDescription="Create a new document." ma:contentTypeScope="" ma:versionID="c8657d84cbcb3d3343990a27ef4d1ac2">
   <xsd:schema xmlns:xsd="http://www.w3.org/2001/XMLSchema" xmlns:xs="http://www.w3.org/2001/XMLSchema" xmlns:p="http://schemas.microsoft.com/office/2006/metadata/properties" xmlns:ns2="dcd3b7ff-f528-4170-a52f-e83b844e5d81" targetNamespace="http://schemas.microsoft.com/office/2006/metadata/properties" ma:root="true" ma:fieldsID="0d965c9d2de9ae1ba3476ad8e0144a56" ns2:_="">
     <xsd:import namespace="dcd3b7ff-f528-4170-a52f-e83b844e5d81"/>
@@ -18816,6 +18961,12 @@
 </ct:contentTypeSchema>
 </file>
 
+<file path=customXml/item2.xml><?xml version="1.0" encoding="utf-8"?>
+<p:properties xmlns:p="http://schemas.microsoft.com/office/2006/metadata/properties" xmlns:xsi="http://www.w3.org/2001/XMLSchema-instance" xmlns:pc="http://schemas.microsoft.com/office/infopath/2007/PartnerControls">
+  <documentManagement/>
+</p:properties>
+</file>
+
 <file path=customXml/item3.xml><?xml version="1.0" encoding="utf-8"?>
 <?mso-contentType ?>
 <FormTemplates xmlns="http://schemas.microsoft.com/sharepoint/v3/contenttype/forms">
@@ -18826,22 +18977,6 @@
 </file>
 
 <file path=customXml/itemProps1.xml><?xml version="1.0" encoding="utf-8"?>
-<ds:datastoreItem xmlns:ds="http://schemas.openxmlformats.org/officeDocument/2006/customXml" ds:itemID="{2018834A-984F-461F-AA51-A4857E6AAEC4}">
-  <ds:schemaRefs>
-    <ds:schemaRef ds:uri="http://purl.org/dc/terms/"/>
-    <ds:schemaRef ds:uri="http://purl.org/dc/elements/1.1/"/>
-    <ds:schemaRef ds:uri="http://www.w3.org/XML/1998/namespace"/>
-    <ds:schemaRef ds:uri="http://schemas.openxmlformats.org/package/2006/metadata/core-properties"/>
-    <ds:schemaRef ds:uri="http://schemas.microsoft.com/office/2006/documentManagement/types"/>
-    <ds:schemaRef ds:uri="http://schemas.microsoft.com/office/2006/metadata/properties"/>
-    <ds:schemaRef ds:uri="http://purl.org/dc/dcmitype/"/>
-    <ds:schemaRef ds:uri="http://schemas.microsoft.com/office/infopath/2007/PartnerControls"/>
-    <ds:schemaRef ds:uri="dcd3b7ff-f528-4170-a52f-e83b844e5d81"/>
-  </ds:schemaRefs>
-</ds:datastoreItem>
-</file>
-
-<file path=customXml/itemProps2.xml><?xml version="1.0" encoding="utf-8"?>
 <ds:datastoreItem xmlns:ds="http://schemas.openxmlformats.org/officeDocument/2006/customXml" ds:itemID="{FF9B192E-9BDA-465C-A03C-F55C5A75F954}">
   <ds:schemaRefs>
     <ds:schemaRef ds:uri="http://schemas.microsoft.com/office/2006/metadata/contentType"/>
@@ -18859,6 +18994,22 @@
 </ds:datastoreItem>
 </file>
 
+<file path=customXml/itemProps2.xml><?xml version="1.0" encoding="utf-8"?>
+<ds:datastoreItem xmlns:ds="http://schemas.openxmlformats.org/officeDocument/2006/customXml" ds:itemID="{2018834A-984F-461F-AA51-A4857E6AAEC4}">
+  <ds:schemaRefs>
+    <ds:schemaRef ds:uri="http://purl.org/dc/terms/"/>
+    <ds:schemaRef ds:uri="http://purl.org/dc/elements/1.1/"/>
+    <ds:schemaRef ds:uri="http://www.w3.org/XML/1998/namespace"/>
+    <ds:schemaRef ds:uri="http://schemas.openxmlformats.org/package/2006/metadata/core-properties"/>
+    <ds:schemaRef ds:uri="http://schemas.microsoft.com/office/2006/documentManagement/types"/>
+    <ds:schemaRef ds:uri="http://schemas.microsoft.com/office/2006/metadata/properties"/>
+    <ds:schemaRef ds:uri="http://purl.org/dc/dcmitype/"/>
+    <ds:schemaRef ds:uri="http://schemas.microsoft.com/office/infopath/2007/PartnerControls"/>
+    <ds:schemaRef ds:uri="dcd3b7ff-f528-4170-a52f-e83b844e5d81"/>
+  </ds:schemaRefs>
+</ds:datastoreItem>
+</file>
+
 <file path=customXml/itemProps3.xml><?xml version="1.0" encoding="utf-8"?>
 <ds:datastoreItem xmlns:ds="http://schemas.openxmlformats.org/officeDocument/2006/customXml" ds:itemID="{7A5E0DA6-A53B-414E-84F5-AC270393C02C}">
   <ds:schemaRefs>

</xml_diff>